<commit_message>
Updated mistakes in PPT
</commit_message>
<xml_diff>
--- a/Presentation/Design Review.pptx
+++ b/Presentation/Design Review.pptx
@@ -18,9 +18,10 @@
     <p:sldId id="269" r:id="rId12"/>
     <p:sldId id="270" r:id="rId13"/>
     <p:sldId id="271" r:id="rId14"/>
-    <p:sldId id="263" r:id="rId15"/>
-    <p:sldId id="264" r:id="rId16"/>
-    <p:sldId id="265" r:id="rId17"/>
+    <p:sldId id="273" r:id="rId15"/>
+    <p:sldId id="263" r:id="rId16"/>
+    <p:sldId id="264" r:id="rId17"/>
+    <p:sldId id="265" r:id="rId18"/>
   </p:sldIdLst>
   <p:sldSz cx="9144000" cy="6858000" type="screen4x3"/>
   <p:notesSz cx="6858000" cy="9144000"/>
@@ -306,7 +307,7 @@
               <a:pPr/>
               <a:t>11/4/2011</a:t>
             </a:fld>
-            <a:endParaRPr lang="en-US"/>
+            <a:endParaRPr lang="en-US" dirty="0"/>
           </a:p>
         </p:txBody>
       </p:sp>
@@ -325,7 +326,7 @@
           <a:bodyPr/>
           <a:lstStyle/>
           <a:p>
-            <a:endParaRPr lang="en-US"/>
+            <a:endParaRPr lang="en-US" dirty="0"/>
           </a:p>
         </p:txBody>
       </p:sp>
@@ -349,7 +350,7 @@
               <a:pPr/>
               <a:t>‹#›</a:t>
             </a:fld>
-            <a:endParaRPr lang="en-US"/>
+            <a:endParaRPr lang="en-US" dirty="0"/>
           </a:p>
         </p:txBody>
       </p:sp>
@@ -473,7 +474,7 @@
               <a:pPr/>
               <a:t>11/4/2011</a:t>
             </a:fld>
-            <a:endParaRPr lang="en-US"/>
+            <a:endParaRPr lang="en-US" dirty="0"/>
           </a:p>
         </p:txBody>
       </p:sp>
@@ -492,7 +493,7 @@
           <a:bodyPr/>
           <a:lstStyle/>
           <a:p>
-            <a:endParaRPr lang="en-US"/>
+            <a:endParaRPr lang="en-US" dirty="0"/>
           </a:p>
         </p:txBody>
       </p:sp>
@@ -516,7 +517,7 @@
               <a:pPr/>
               <a:t>‹#›</a:t>
             </a:fld>
-            <a:endParaRPr lang="en-US"/>
+            <a:endParaRPr lang="en-US" dirty="0"/>
           </a:p>
         </p:txBody>
       </p:sp>
@@ -650,7 +651,7 @@
               <a:pPr/>
               <a:t>11/4/2011</a:t>
             </a:fld>
-            <a:endParaRPr lang="en-US"/>
+            <a:endParaRPr lang="en-US" dirty="0"/>
           </a:p>
         </p:txBody>
       </p:sp>
@@ -669,7 +670,7 @@
           <a:bodyPr/>
           <a:lstStyle/>
           <a:p>
-            <a:endParaRPr lang="en-US"/>
+            <a:endParaRPr lang="en-US" dirty="0"/>
           </a:p>
         </p:txBody>
       </p:sp>
@@ -693,7 +694,7 @@
               <a:pPr/>
               <a:t>‹#›</a:t>
             </a:fld>
-            <a:endParaRPr lang="en-US"/>
+            <a:endParaRPr lang="en-US" dirty="0"/>
           </a:p>
         </p:txBody>
       </p:sp>
@@ -817,7 +818,7 @@
               <a:pPr/>
               <a:t>11/4/2011</a:t>
             </a:fld>
-            <a:endParaRPr lang="en-US"/>
+            <a:endParaRPr lang="en-US" dirty="0"/>
           </a:p>
         </p:txBody>
       </p:sp>
@@ -836,7 +837,7 @@
           <a:bodyPr/>
           <a:lstStyle/>
           <a:p>
-            <a:endParaRPr lang="en-US"/>
+            <a:endParaRPr lang="en-US" dirty="0"/>
           </a:p>
         </p:txBody>
       </p:sp>
@@ -860,7 +861,7 @@
               <a:pPr/>
               <a:t>‹#›</a:t>
             </a:fld>
-            <a:endParaRPr lang="en-US"/>
+            <a:endParaRPr lang="en-US" dirty="0"/>
           </a:p>
         </p:txBody>
       </p:sp>
@@ -1060,7 +1061,7 @@
               <a:pPr/>
               <a:t>11/4/2011</a:t>
             </a:fld>
-            <a:endParaRPr lang="en-US"/>
+            <a:endParaRPr lang="en-US" dirty="0"/>
           </a:p>
         </p:txBody>
       </p:sp>
@@ -1079,7 +1080,7 @@
           <a:bodyPr/>
           <a:lstStyle/>
           <a:p>
-            <a:endParaRPr lang="en-US"/>
+            <a:endParaRPr lang="en-US" dirty="0"/>
           </a:p>
         </p:txBody>
       </p:sp>
@@ -1103,7 +1104,7 @@
               <a:pPr/>
               <a:t>‹#›</a:t>
             </a:fld>
-            <a:endParaRPr lang="en-US"/>
+            <a:endParaRPr lang="en-US" dirty="0"/>
           </a:p>
         </p:txBody>
       </p:sp>
@@ -1345,7 +1346,7 @@
               <a:pPr/>
               <a:t>11/4/2011</a:t>
             </a:fld>
-            <a:endParaRPr lang="en-US"/>
+            <a:endParaRPr lang="en-US" dirty="0"/>
           </a:p>
         </p:txBody>
       </p:sp>
@@ -1364,7 +1365,7 @@
           <a:bodyPr/>
           <a:lstStyle/>
           <a:p>
-            <a:endParaRPr lang="en-US"/>
+            <a:endParaRPr lang="en-US" dirty="0"/>
           </a:p>
         </p:txBody>
       </p:sp>
@@ -1388,7 +1389,7 @@
               <a:pPr/>
               <a:t>‹#›</a:t>
             </a:fld>
-            <a:endParaRPr lang="en-US"/>
+            <a:endParaRPr lang="en-US" dirty="0"/>
           </a:p>
         </p:txBody>
       </p:sp>
@@ -1764,7 +1765,7 @@
               <a:pPr/>
               <a:t>11/4/2011</a:t>
             </a:fld>
-            <a:endParaRPr lang="en-US"/>
+            <a:endParaRPr lang="en-US" dirty="0"/>
           </a:p>
         </p:txBody>
       </p:sp>
@@ -1783,7 +1784,7 @@
           <a:bodyPr/>
           <a:lstStyle/>
           <a:p>
-            <a:endParaRPr lang="en-US"/>
+            <a:endParaRPr lang="en-US" dirty="0"/>
           </a:p>
         </p:txBody>
       </p:sp>
@@ -1807,7 +1808,7 @@
               <a:pPr/>
               <a:t>‹#›</a:t>
             </a:fld>
-            <a:endParaRPr lang="en-US"/>
+            <a:endParaRPr lang="en-US" dirty="0"/>
           </a:p>
         </p:txBody>
       </p:sp>
@@ -1879,7 +1880,7 @@
               <a:pPr/>
               <a:t>11/4/2011</a:t>
             </a:fld>
-            <a:endParaRPr lang="en-US"/>
+            <a:endParaRPr lang="en-US" dirty="0"/>
           </a:p>
         </p:txBody>
       </p:sp>
@@ -1898,7 +1899,7 @@
           <a:bodyPr/>
           <a:lstStyle/>
           <a:p>
-            <a:endParaRPr lang="en-US"/>
+            <a:endParaRPr lang="en-US" dirty="0"/>
           </a:p>
         </p:txBody>
       </p:sp>
@@ -1922,7 +1923,7 @@
               <a:pPr/>
               <a:t>‹#›</a:t>
             </a:fld>
-            <a:endParaRPr lang="en-US"/>
+            <a:endParaRPr lang="en-US" dirty="0"/>
           </a:p>
         </p:txBody>
       </p:sp>
@@ -1971,7 +1972,7 @@
               <a:pPr/>
               <a:t>11/4/2011</a:t>
             </a:fld>
-            <a:endParaRPr lang="en-US"/>
+            <a:endParaRPr lang="en-US" dirty="0"/>
           </a:p>
         </p:txBody>
       </p:sp>
@@ -1990,7 +1991,7 @@
           <a:bodyPr/>
           <a:lstStyle/>
           <a:p>
-            <a:endParaRPr lang="en-US"/>
+            <a:endParaRPr lang="en-US" dirty="0"/>
           </a:p>
         </p:txBody>
       </p:sp>
@@ -2014,7 +2015,7 @@
               <a:pPr/>
               <a:t>‹#›</a:t>
             </a:fld>
-            <a:endParaRPr lang="en-US"/>
+            <a:endParaRPr lang="en-US" dirty="0"/>
           </a:p>
         </p:txBody>
       </p:sp>
@@ -2245,7 +2246,7 @@
               <a:pPr/>
               <a:t>11/4/2011</a:t>
             </a:fld>
-            <a:endParaRPr lang="en-US"/>
+            <a:endParaRPr lang="en-US" dirty="0"/>
           </a:p>
         </p:txBody>
       </p:sp>
@@ -2264,7 +2265,7 @@
           <a:bodyPr/>
           <a:lstStyle/>
           <a:p>
-            <a:endParaRPr lang="en-US"/>
+            <a:endParaRPr lang="en-US" dirty="0"/>
           </a:p>
         </p:txBody>
       </p:sp>
@@ -2288,7 +2289,7 @@
               <a:pPr/>
               <a:t>‹#›</a:t>
             </a:fld>
-            <a:endParaRPr lang="en-US"/>
+            <a:endParaRPr lang="en-US" dirty="0"/>
           </a:p>
         </p:txBody>
       </p:sp>
@@ -2406,7 +2407,7 @@
             </a:lvl9pPr>
           </a:lstStyle>
           <a:p>
-            <a:endParaRPr lang="en-US"/>
+            <a:endParaRPr lang="en-US" dirty="0"/>
           </a:p>
         </p:txBody>
       </p:sp>
@@ -2495,7 +2496,7 @@
               <a:pPr/>
               <a:t>11/4/2011</a:t>
             </a:fld>
-            <a:endParaRPr lang="en-US"/>
+            <a:endParaRPr lang="en-US" dirty="0"/>
           </a:p>
         </p:txBody>
       </p:sp>
@@ -2514,7 +2515,7 @@
           <a:bodyPr/>
           <a:lstStyle/>
           <a:p>
-            <a:endParaRPr lang="en-US"/>
+            <a:endParaRPr lang="en-US" dirty="0"/>
           </a:p>
         </p:txBody>
       </p:sp>
@@ -2538,7 +2539,7 @@
               <a:pPr/>
               <a:t>‹#›</a:t>
             </a:fld>
-            <a:endParaRPr lang="en-US"/>
+            <a:endParaRPr lang="en-US" dirty="0"/>
           </a:p>
         </p:txBody>
       </p:sp>
@@ -2705,7 +2706,7 @@
               <a:pPr/>
               <a:t>11/4/2011</a:t>
             </a:fld>
-            <a:endParaRPr lang="en-US"/>
+            <a:endParaRPr lang="en-US" dirty="0"/>
           </a:p>
         </p:txBody>
       </p:sp>
@@ -2742,7 +2743,7 @@
             </a:lvl1pPr>
           </a:lstStyle>
           <a:p>
-            <a:endParaRPr lang="en-US"/>
+            <a:endParaRPr lang="en-US" dirty="0"/>
           </a:p>
         </p:txBody>
       </p:sp>
@@ -2784,7 +2785,7 @@
               <a:pPr/>
               <a:t>‹#›</a:t>
             </a:fld>
-            <a:endParaRPr lang="en-US"/>
+            <a:endParaRPr lang="en-US" dirty="0"/>
           </a:p>
         </p:txBody>
       </p:sp>
@@ -3141,15 +3142,7 @@
             </a:br>
             <a:r>
               <a:rPr lang="en-US" dirty="0" smtClean="0"/>
-              <a:t>Wave-Motion </a:t>
-            </a:r>
-            <a:r>
-              <a:rPr lang="en-US" dirty="0" err="1" smtClean="0"/>
-              <a:t>Arduino</a:t>
-            </a:r>
-            <a:r>
-              <a:rPr lang="en-US" dirty="0" smtClean="0"/>
-              <a:t> Shield</a:t>
+              <a:t>Wave-Motion Arduino Shield</a:t>
             </a:r>
             <a:endParaRPr lang="en-US" dirty="0"/>
           </a:p>
@@ -3180,21 +3173,8 @@
             <a:pPr algn="ctr"/>
             <a:r>
               <a:rPr lang="en-US" sz="3200" dirty="0" smtClean="0"/>
-              <a:t>Presented By:  Jordan </a:t>
-            </a:r>
-            <a:r>
-              <a:rPr lang="en-US" sz="3200" dirty="0" err="1" smtClean="0"/>
-              <a:t>Visser</a:t>
-            </a:r>
-            <a:r>
-              <a:rPr lang="en-US" sz="3200" dirty="0" smtClean="0"/>
-              <a:t> &amp; Steven </a:t>
-            </a:r>
-            <a:r>
-              <a:rPr lang="en-US" sz="3200" dirty="0" err="1" smtClean="0"/>
-              <a:t>Diemer</a:t>
-            </a:r>
-            <a:endParaRPr lang="en-US" sz="3200" dirty="0" smtClean="0"/>
+              <a:t>Presented By:  Jordan Visser &amp; Steven Diemer</a:t>
+            </a:r>
           </a:p>
           <a:p>
             <a:pPr algn="ctr"/>
@@ -3211,13 +3191,8 @@
             <a:pPr algn="ctr"/>
             <a:r>
               <a:rPr lang="en-US" sz="3200" dirty="0" smtClean="0"/>
-              <a:t>Instructor:  Andrew </a:t>
-            </a:r>
-            <a:r>
-              <a:rPr lang="en-US" sz="3200" dirty="0" err="1" smtClean="0"/>
-              <a:t>Sterian</a:t>
-            </a:r>
-            <a:endParaRPr lang="en-US" sz="3200" dirty="0" smtClean="0"/>
+              <a:t>Instructor:  Andrew Sterian</a:t>
+            </a:r>
           </a:p>
         </p:txBody>
       </p:sp>
@@ -3271,28 +3246,12 @@
           <a:lstStyle/>
           <a:p>
             <a:r>
-              <a:rPr lang="en-US" sz="3600" dirty="0" err="1"/>
-              <a:t>Arduino</a:t>
-            </a:r>
-            <a:r>
               <a:rPr lang="en-US" sz="3600" dirty="0"/>
-              <a:t> </a:t>
+              <a:t>Arduino </a:t>
             </a:r>
             <a:r>
               <a:rPr lang="en-US" sz="3600" dirty="0" smtClean="0"/>
-              <a:t>Pin-Out, </a:t>
-            </a:r>
-            <a:r>
-              <a:rPr lang="en-US" sz="3600" dirty="0" smtClean="0"/>
-              <a:t>Switch and </a:t>
-            </a:r>
-            <a:r>
-              <a:rPr lang="en-US" sz="3600" dirty="0" smtClean="0"/>
-              <a:t>Push </a:t>
-            </a:r>
-            <a:r>
-              <a:rPr lang="en-US" sz="3600" dirty="0" smtClean="0"/>
-              <a:t>Buttons</a:t>
+              <a:t>Pin-Out, Switch and Push Buttons</a:t>
             </a:r>
             <a:endParaRPr lang="en-US" sz="3600" dirty="0"/>
           </a:p>
@@ -3310,7 +3269,7 @@
           <a:blip r:embed="rId2" cstate="print">
             <a:extLst>
               <a:ext uri="{28A0092B-C50C-407E-A947-70E740481C1C}">
-                <a14:useLocalDpi xmlns:a14="http://schemas.microsoft.com/office/drawing/2010/main" xmlns="" val="0"/>
+                <a14:useLocalDpi xmlns:a14="http://schemas.microsoft.com/office/drawing/2010/main" val="0"/>
               </a:ext>
             </a:extLst>
           </a:blip>
@@ -3334,14 +3293,14 @@
           <a:effectLst/>
           <a:extLst>
             <a:ext uri="{909E8E84-426E-40DD-AFC4-6F175D3DCCD1}">
-              <a14:hiddenFill xmlns:a14="http://schemas.microsoft.com/office/drawing/2010/main" xmlns="">
+              <a14:hiddenFill xmlns:a14="http://schemas.microsoft.com/office/drawing/2010/main">
                 <a:solidFill>
                   <a:schemeClr val="accent1"/>
                 </a:solidFill>
               </a14:hiddenFill>
             </a:ext>
             <a:ext uri="{91240B29-F687-4F45-9708-019B960494DF}">
-              <a14:hiddenLine xmlns:a14="http://schemas.microsoft.com/office/drawing/2010/main" xmlns="" w="9525">
+              <a14:hiddenLine xmlns:a14="http://schemas.microsoft.com/office/drawing/2010/main" w="9525">
                 <a:solidFill>
                   <a:schemeClr val="tx1"/>
                 </a:solidFill>
@@ -3351,7 +3310,7 @@
               </a14:hiddenLine>
             </a:ext>
             <a:ext uri="{AF507438-7753-43E0-B8FC-AC1667EBCBE1}">
-              <a14:hiddenEffects xmlns:a14="http://schemas.microsoft.com/office/drawing/2010/main" xmlns="">
+              <a14:hiddenEffects xmlns:a14="http://schemas.microsoft.com/office/drawing/2010/main">
                 <a:effectLst>
                   <a:outerShdw dist="35921" dir="2700000" algn="ctr" rotWithShape="0">
                     <a:schemeClr val="bg2"/>
@@ -3397,7 +3356,7 @@
     </p:spTree>
     <p:extLst>
       <p:ext uri="{BB962C8B-B14F-4D97-AF65-F5344CB8AC3E}">
-        <p14:creationId xmlns:p14="http://schemas.microsoft.com/office/powerpoint/2010/main" xmlns="" val="3969340401"/>
+        <p14:creationId xmlns:p14="http://schemas.microsoft.com/office/powerpoint/2010/main" val="3969340401"/>
       </p:ext>
     </p:extLst>
   </p:cSld>
@@ -3450,15 +3409,7 @@
           <a:p>
             <a:r>
               <a:rPr lang="en-US" dirty="0" smtClean="0"/>
-              <a:t>Level </a:t>
-            </a:r>
-            <a:r>
-              <a:rPr lang="en-US" dirty="0" smtClean="0"/>
-              <a:t>Shifters </a:t>
-            </a:r>
-            <a:r>
-              <a:rPr lang="en-US" dirty="0" smtClean="0"/>
-              <a:t>and Flash Memory</a:t>
+              <a:t>Level Shifters and Flash Memory</a:t>
             </a:r>
             <a:endParaRPr lang="en-US" dirty="0"/>
           </a:p>
@@ -3476,7 +3427,7 @@
           <a:blip r:embed="rId2" cstate="print">
             <a:extLst>
               <a:ext uri="{28A0092B-C50C-407E-A947-70E740481C1C}">
-                <a14:useLocalDpi xmlns:a14="http://schemas.microsoft.com/office/drawing/2010/main" xmlns="" val="0"/>
+                <a14:useLocalDpi xmlns:a14="http://schemas.microsoft.com/office/drawing/2010/main" val="0"/>
               </a:ext>
             </a:extLst>
           </a:blip>
@@ -3500,14 +3451,14 @@
           <a:effectLst/>
           <a:extLst>
             <a:ext uri="{909E8E84-426E-40DD-AFC4-6F175D3DCCD1}">
-              <a14:hiddenFill xmlns:a14="http://schemas.microsoft.com/office/drawing/2010/main" xmlns="">
+              <a14:hiddenFill xmlns:a14="http://schemas.microsoft.com/office/drawing/2010/main">
                 <a:solidFill>
                   <a:schemeClr val="accent1"/>
                 </a:solidFill>
               </a14:hiddenFill>
             </a:ext>
             <a:ext uri="{91240B29-F687-4F45-9708-019B960494DF}">
-              <a14:hiddenLine xmlns:a14="http://schemas.microsoft.com/office/drawing/2010/main" xmlns="" w="9525">
+              <a14:hiddenLine xmlns:a14="http://schemas.microsoft.com/office/drawing/2010/main" w="9525">
                 <a:solidFill>
                   <a:schemeClr val="tx1"/>
                 </a:solidFill>
@@ -3517,7 +3468,7 @@
               </a14:hiddenLine>
             </a:ext>
             <a:ext uri="{AF507438-7753-43E0-B8FC-AC1667EBCBE1}">
-              <a14:hiddenEffects xmlns:a14="http://schemas.microsoft.com/office/drawing/2010/main" xmlns="">
+              <a14:hiddenEffects xmlns:a14="http://schemas.microsoft.com/office/drawing/2010/main">
                 <a:effectLst>
                   <a:outerShdw dist="35921" dir="2700000" algn="ctr" rotWithShape="0">
                     <a:schemeClr val="bg2"/>
@@ -3540,7 +3491,7 @@
           <a:blip r:embed="rId3" cstate="print">
             <a:extLst>
               <a:ext uri="{28A0092B-C50C-407E-A947-70E740481C1C}">
-                <a14:useLocalDpi xmlns:a14="http://schemas.microsoft.com/office/drawing/2010/main" xmlns="" val="0"/>
+                <a14:useLocalDpi xmlns:a14="http://schemas.microsoft.com/office/drawing/2010/main" val="0"/>
               </a:ext>
             </a:extLst>
           </a:blip>
@@ -3564,14 +3515,14 @@
           <a:effectLst/>
           <a:extLst>
             <a:ext uri="{909E8E84-426E-40DD-AFC4-6F175D3DCCD1}">
-              <a14:hiddenFill xmlns:a14="http://schemas.microsoft.com/office/drawing/2010/main" xmlns="">
+              <a14:hiddenFill xmlns:a14="http://schemas.microsoft.com/office/drawing/2010/main">
                 <a:solidFill>
                   <a:schemeClr val="accent1"/>
                 </a:solidFill>
               </a14:hiddenFill>
             </a:ext>
             <a:ext uri="{91240B29-F687-4F45-9708-019B960494DF}">
-              <a14:hiddenLine xmlns:a14="http://schemas.microsoft.com/office/drawing/2010/main" xmlns="" w="9525">
+              <a14:hiddenLine xmlns:a14="http://schemas.microsoft.com/office/drawing/2010/main" w="9525">
                 <a:solidFill>
                   <a:schemeClr val="tx1"/>
                 </a:solidFill>
@@ -3581,7 +3532,7 @@
               </a14:hiddenLine>
             </a:ext>
             <a:ext uri="{AF507438-7753-43E0-B8FC-AC1667EBCBE1}">
-              <a14:hiddenEffects xmlns:a14="http://schemas.microsoft.com/office/drawing/2010/main" xmlns="">
+              <a14:hiddenEffects xmlns:a14="http://schemas.microsoft.com/office/drawing/2010/main">
                 <a:effectLst>
                   <a:outerShdw dist="35921" dir="2700000" algn="ctr" rotWithShape="0">
                     <a:schemeClr val="bg2"/>
@@ -3604,7 +3555,7 @@
           <a:blip r:embed="rId4" cstate="print">
             <a:extLst>
               <a:ext uri="{28A0092B-C50C-407E-A947-70E740481C1C}">
-                <a14:useLocalDpi xmlns:a14="http://schemas.microsoft.com/office/drawing/2010/main" xmlns="" val="0"/>
+                <a14:useLocalDpi xmlns:a14="http://schemas.microsoft.com/office/drawing/2010/main" val="0"/>
               </a:ext>
             </a:extLst>
           </a:blip>
@@ -3628,14 +3579,14 @@
           <a:effectLst/>
           <a:extLst>
             <a:ext uri="{909E8E84-426E-40DD-AFC4-6F175D3DCCD1}">
-              <a14:hiddenFill xmlns:a14="http://schemas.microsoft.com/office/drawing/2010/main" xmlns="">
+              <a14:hiddenFill xmlns:a14="http://schemas.microsoft.com/office/drawing/2010/main">
                 <a:solidFill>
                   <a:schemeClr val="accent1"/>
                 </a:solidFill>
               </a14:hiddenFill>
             </a:ext>
             <a:ext uri="{91240B29-F687-4F45-9708-019B960494DF}">
-              <a14:hiddenLine xmlns:a14="http://schemas.microsoft.com/office/drawing/2010/main" xmlns="" w="9525">
+              <a14:hiddenLine xmlns:a14="http://schemas.microsoft.com/office/drawing/2010/main" w="9525">
                 <a:solidFill>
                   <a:schemeClr val="tx1"/>
                 </a:solidFill>
@@ -3645,7 +3596,7 @@
               </a14:hiddenLine>
             </a:ext>
             <a:ext uri="{AF507438-7753-43E0-B8FC-AC1667EBCBE1}">
-              <a14:hiddenEffects xmlns:a14="http://schemas.microsoft.com/office/drawing/2010/main" xmlns="">
+              <a14:hiddenEffects xmlns:a14="http://schemas.microsoft.com/office/drawing/2010/main">
                 <a:effectLst>
                   <a:outerShdw dist="35921" dir="2700000" algn="ctr" rotWithShape="0">
                     <a:schemeClr val="bg2"/>
@@ -3659,7 +3610,7 @@
     </p:spTree>
     <p:extLst>
       <p:ext uri="{BB962C8B-B14F-4D97-AF65-F5344CB8AC3E}">
-        <p14:creationId xmlns:p14="http://schemas.microsoft.com/office/powerpoint/2010/main" xmlns="" val="2757106809"/>
+        <p14:creationId xmlns:p14="http://schemas.microsoft.com/office/powerpoint/2010/main" val="2757106809"/>
       </p:ext>
     </p:extLst>
   </p:cSld>
@@ -3712,11 +3663,7 @@
           <a:p>
             <a:r>
               <a:rPr lang="en-US" dirty="0" smtClean="0"/>
-              <a:t>Digital-to-Analog </a:t>
-            </a:r>
-            <a:r>
-              <a:rPr lang="en-US" dirty="0" smtClean="0"/>
-              <a:t>Converter</a:t>
+              <a:t>Digital-to-Analog Converter</a:t>
             </a:r>
             <a:endParaRPr lang="en-US" dirty="0"/>
           </a:p>
@@ -3734,7 +3681,7 @@
           <a:blip r:embed="rId2" cstate="print">
             <a:extLst>
               <a:ext uri="{28A0092B-C50C-407E-A947-70E740481C1C}">
-                <a14:useLocalDpi xmlns:a14="http://schemas.microsoft.com/office/drawing/2010/main" xmlns="" val="0"/>
+                <a14:useLocalDpi xmlns:a14="http://schemas.microsoft.com/office/drawing/2010/main" val="0"/>
               </a:ext>
             </a:extLst>
           </a:blip>
@@ -3758,14 +3705,14 @@
           <a:effectLst/>
           <a:extLst>
             <a:ext uri="{909E8E84-426E-40DD-AFC4-6F175D3DCCD1}">
-              <a14:hiddenFill xmlns:a14="http://schemas.microsoft.com/office/drawing/2010/main" xmlns="">
+              <a14:hiddenFill xmlns:a14="http://schemas.microsoft.com/office/drawing/2010/main">
                 <a:solidFill>
                   <a:schemeClr val="accent1"/>
                 </a:solidFill>
               </a14:hiddenFill>
             </a:ext>
             <a:ext uri="{91240B29-F687-4F45-9708-019B960494DF}">
-              <a14:hiddenLine xmlns:a14="http://schemas.microsoft.com/office/drawing/2010/main" xmlns="" w="9525">
+              <a14:hiddenLine xmlns:a14="http://schemas.microsoft.com/office/drawing/2010/main" w="9525">
                 <a:solidFill>
                   <a:schemeClr val="tx1"/>
                 </a:solidFill>
@@ -3775,7 +3722,7 @@
               </a14:hiddenLine>
             </a:ext>
             <a:ext uri="{AF507438-7753-43E0-B8FC-AC1667EBCBE1}">
-              <a14:hiddenEffects xmlns:a14="http://schemas.microsoft.com/office/drawing/2010/main" xmlns="">
+              <a14:hiddenEffects xmlns:a14="http://schemas.microsoft.com/office/drawing/2010/main">
                 <a:effectLst>
                   <a:outerShdw dist="35921" dir="2700000" algn="ctr" rotWithShape="0">
                     <a:schemeClr val="bg2"/>
@@ -3789,7 +3736,7 @@
     </p:spTree>
     <p:extLst>
       <p:ext uri="{BB962C8B-B14F-4D97-AF65-F5344CB8AC3E}">
-        <p14:creationId xmlns:p14="http://schemas.microsoft.com/office/powerpoint/2010/main" xmlns="" val="4150703827"/>
+        <p14:creationId xmlns:p14="http://schemas.microsoft.com/office/powerpoint/2010/main" val="4150703827"/>
       </p:ext>
     </p:extLst>
   </p:cSld>
@@ -3851,7 +3798,7 @@
           <a:blip r:embed="rId2" cstate="print">
             <a:extLst>
               <a:ext uri="{28A0092B-C50C-407E-A947-70E740481C1C}">
-                <a14:useLocalDpi xmlns:a14="http://schemas.microsoft.com/office/drawing/2010/main" xmlns="" val="0"/>
+                <a14:useLocalDpi xmlns:a14="http://schemas.microsoft.com/office/drawing/2010/main" val="0"/>
               </a:ext>
             </a:extLst>
           </a:blip>
@@ -3875,14 +3822,14 @@
           <a:effectLst/>
           <a:extLst>
             <a:ext uri="{909E8E84-426E-40DD-AFC4-6F175D3DCCD1}">
-              <a14:hiddenFill xmlns:a14="http://schemas.microsoft.com/office/drawing/2010/main" xmlns="">
+              <a14:hiddenFill xmlns:a14="http://schemas.microsoft.com/office/drawing/2010/main">
                 <a:solidFill>
                   <a:schemeClr val="accent1"/>
                 </a:solidFill>
               </a14:hiddenFill>
             </a:ext>
             <a:ext uri="{91240B29-F687-4F45-9708-019B960494DF}">
-              <a14:hiddenLine xmlns:a14="http://schemas.microsoft.com/office/drawing/2010/main" xmlns="" w="9525">
+              <a14:hiddenLine xmlns:a14="http://schemas.microsoft.com/office/drawing/2010/main" w="9525">
                 <a:solidFill>
                   <a:schemeClr val="tx1"/>
                 </a:solidFill>
@@ -3892,7 +3839,7 @@
               </a14:hiddenLine>
             </a:ext>
             <a:ext uri="{AF507438-7753-43E0-B8FC-AC1667EBCBE1}">
-              <a14:hiddenEffects xmlns:a14="http://schemas.microsoft.com/office/drawing/2010/main" xmlns="">
+              <a14:hiddenEffects xmlns:a14="http://schemas.microsoft.com/office/drawing/2010/main">
                 <a:effectLst>
                   <a:outerShdw dist="35921" dir="2700000" algn="ctr" rotWithShape="0">
                     <a:schemeClr val="bg2"/>
@@ -3906,13 +3853,20 @@
     </p:spTree>
     <p:extLst>
       <p:ext uri="{BB962C8B-B14F-4D97-AF65-F5344CB8AC3E}">
-        <p14:creationId xmlns:p14="http://schemas.microsoft.com/office/powerpoint/2010/main" xmlns="" val="4014160238"/>
+        <p14:creationId xmlns:p14="http://schemas.microsoft.com/office/powerpoint/2010/main" val="4014160238"/>
       </p:ext>
     </p:extLst>
   </p:cSld>
   <p:clrMapOvr>
     <a:masterClrMapping/>
   </p:clrMapOvr>
+  <p:timing>
+    <p:tnLst>
+      <p:par>
+        <p:cTn id="1" dur="indefinite" restart="never" nodeType="tmRoot"/>
+      </p:par>
+    </p:tnLst>
+  </p:timing>
 </p:sld>
 </file>
 
@@ -3935,7 +3889,7 @@
       </p:grpSpPr>
       <p:sp>
         <p:nvSpPr>
-          <p:cNvPr id="2" name="Title 1"/>
+          <p:cNvPr id="7" name="Title 6"/>
           <p:cNvSpPr>
             <a:spLocks noGrp="1"/>
           </p:cNvSpPr>
@@ -3948,13 +3902,13 @@
           <a:bodyPr/>
           <a:lstStyle/>
           <a:p>
-            <a:endParaRPr lang="en-US"/>
-          </a:p>
-        </p:txBody>
-      </p:sp>
-      <p:sp>
-        <p:nvSpPr>
-          <p:cNvPr id="3" name="Content Placeholder 2"/>
+            <a:endParaRPr lang="en-US" dirty="0"/>
+          </a:p>
+        </p:txBody>
+      </p:sp>
+      <p:sp>
+        <p:nvSpPr>
+          <p:cNvPr id="8" name="Content Placeholder 7"/>
           <p:cNvSpPr>
             <a:spLocks noGrp="1"/>
           </p:cNvSpPr>
@@ -3967,7 +3921,7 @@
           <a:bodyPr/>
           <a:lstStyle/>
           <a:p>
-            <a:endParaRPr lang="en-US"/>
+            <a:endParaRPr lang="en-US" dirty="0"/>
           </a:p>
         </p:txBody>
       </p:sp>
@@ -4013,8 +3967,8 @@
         </p:nvSpPr>
         <p:spPr>
           <a:xfrm>
-            <a:off x="1981200" y="304800"/>
-            <a:ext cx="5209503" cy="769441"/>
+            <a:off x="3200982" y="315686"/>
+            <a:ext cx="2742033" cy="769441"/>
           </a:xfrm>
           <a:prstGeom prst="rect">
             <a:avLst/>
@@ -4026,58 +3980,31 @@
           </a:bodyPr>
           <a:lstStyle/>
           <a:p>
-            <a:r>
-              <a:rPr lang="en-US" sz="4400" b="1" i="1" dirty="0" smtClean="0"/>
-              <a:t>Relevant Calculations</a:t>
+            <a:pPr algn="ctr"/>
+            <a:r>
+              <a:rPr lang="en-US" sz="4400" dirty="0"/>
+              <a:t>PCB Layout</a:t>
             </a:r>
             <a:endParaRPr lang="en-US" sz="4400" b="1" i="1" dirty="0"/>
-          </a:p>
-        </p:txBody>
-      </p:sp>
-      <p:sp>
-        <p:nvSpPr>
-          <p:cNvPr id="6" name="TextBox 5"/>
-          <p:cNvSpPr txBox="1"/>
-          <p:nvPr/>
-        </p:nvSpPr>
-        <p:spPr>
-          <a:xfrm>
-            <a:off x="304800" y="1371600"/>
-            <a:ext cx="5029200" cy="461665"/>
-          </a:xfrm>
-          <a:prstGeom prst="rect">
-            <a:avLst/>
-          </a:prstGeom>
-          <a:noFill/>
-        </p:spPr>
-        <p:txBody>
-          <a:bodyPr wrap="square" rtlCol="0">
-            <a:spAutoFit/>
-          </a:bodyPr>
-          <a:lstStyle/>
-          <a:p>
-            <a:r>
-              <a:rPr lang="en-US" sz="2400" dirty="0" smtClean="0"/>
-              <a:t>Sampling </a:t>
-            </a:r>
-            <a:r>
-              <a:rPr lang="en-US" sz="2400" dirty="0" smtClean="0"/>
-              <a:t>Rate:   73.7 kHz (optimal)</a:t>
-            </a:r>
-            <a:endParaRPr lang="en-US" sz="2400" dirty="0"/>
           </a:p>
         </p:txBody>
       </p:sp>
       <p:pic>
         <p:nvPicPr>
-          <p:cNvPr id="2050" name="Picture 2"/>
+          <p:cNvPr id="10" name="Picture 2"/>
           <p:cNvPicPr>
             <a:picLocks noChangeAspect="1" noChangeArrowheads="1"/>
           </p:cNvPicPr>
           <p:nvPr/>
         </p:nvPicPr>
         <p:blipFill>
-          <a:blip r:embed="rId3" cstate="print"/>
+          <a:blip r:embed="rId3" cstate="print">
+            <a:extLst>
+              <a:ext uri="{28A0092B-C50C-407E-A947-70E740481C1C}">
+                <a14:useLocalDpi xmlns:a14="http://schemas.microsoft.com/office/drawing/2010/main" val="0"/>
+              </a:ext>
+            </a:extLst>
+          </a:blip>
           <a:srcRect/>
           <a:stretch>
             <a:fillRect/>
@@ -4085,25 +4012,53 @@
         </p:blipFill>
         <p:spPr bwMode="auto">
           <a:xfrm>
-            <a:off x="992730" y="2133600"/>
-            <a:ext cx="7236870" cy="3048000"/>
+            <a:off x="1607342" y="1371600"/>
+            <a:ext cx="5929312" cy="5061230"/>
           </a:xfrm>
           <a:prstGeom prst="rect">
             <a:avLst/>
           </a:prstGeom>
+          <a:noFill/>
           <a:ln>
             <a:noFill/>
           </a:ln>
-          <a:effectLst>
-            <a:outerShdw blurRad="292100" dist="139700" dir="2700000" algn="tl" rotWithShape="0">
-              <a:srgbClr val="333333">
-                <a:alpha val="65000"/>
-              </a:srgbClr>
-            </a:outerShdw>
-          </a:effectLst>
+          <a:effectLst/>
+          <a:extLst>
+            <a:ext uri="{909E8E84-426E-40DD-AFC4-6F175D3DCCD1}">
+              <a14:hiddenFill xmlns:a14="http://schemas.microsoft.com/office/drawing/2010/main">
+                <a:solidFill>
+                  <a:schemeClr val="accent1"/>
+                </a:solidFill>
+              </a14:hiddenFill>
+            </a:ext>
+            <a:ext uri="{91240B29-F687-4F45-9708-019B960494DF}">
+              <a14:hiddenLine xmlns:a14="http://schemas.microsoft.com/office/drawing/2010/main" w="9525">
+                <a:solidFill>
+                  <a:schemeClr val="tx1"/>
+                </a:solidFill>
+                <a:miter lim="800000"/>
+                <a:headEnd/>
+                <a:tailEnd/>
+              </a14:hiddenLine>
+            </a:ext>
+            <a:ext uri="{AF507438-7753-43E0-B8FC-AC1667EBCBE1}">
+              <a14:hiddenEffects xmlns:a14="http://schemas.microsoft.com/office/drawing/2010/main">
+                <a:effectLst>
+                  <a:outerShdw dist="35921" dir="2700000" algn="ctr" rotWithShape="0">
+                    <a:schemeClr val="bg2"/>
+                  </a:outerShdw>
+                </a:effectLst>
+              </a14:hiddenEffects>
+            </a:ext>
+          </a:extLst>
         </p:spPr>
       </p:pic>
     </p:spTree>
+    <p:extLst>
+      <p:ext uri="{BB962C8B-B14F-4D97-AF65-F5344CB8AC3E}">
+        <p14:creationId xmlns:p14="http://schemas.microsoft.com/office/powerpoint/2010/main" val="3508047719"/>
+      </p:ext>
+    </p:extLst>
   </p:cSld>
   <p:clrMapOvr>
     <a:masterClrMapping/>
@@ -4150,7 +4105,7 @@
           <a:bodyPr/>
           <a:lstStyle/>
           <a:p>
-            <a:endParaRPr lang="en-US"/>
+            <a:endParaRPr lang="en-US" dirty="0"/>
           </a:p>
         </p:txBody>
       </p:sp>
@@ -4169,7 +4124,7 @@
           <a:bodyPr/>
           <a:lstStyle/>
           <a:p>
-            <a:endParaRPr lang="en-US"/>
+            <a:endParaRPr lang="en-US" dirty="0"/>
           </a:p>
         </p:txBody>
       </p:sp>
@@ -4215,8 +4170,8 @@
         </p:nvSpPr>
         <p:spPr>
           <a:xfrm>
-            <a:off x="533400" y="381000"/>
-            <a:ext cx="8080032" cy="769441"/>
+            <a:off x="1981200" y="304800"/>
+            <a:ext cx="5209503" cy="769441"/>
           </a:xfrm>
           <a:prstGeom prst="rect">
             <a:avLst/>
@@ -4230,7 +4185,7 @@
           <a:p>
             <a:r>
               <a:rPr lang="en-US" sz="4400" b="1" i="1" dirty="0" smtClean="0"/>
-              <a:t>Relevant Calculations (Continued)</a:t>
+              <a:t>Relevant Calculations</a:t>
             </a:r>
             <a:endParaRPr lang="en-US" sz="4400" b="1" i="1" dirty="0"/>
           </a:p>
@@ -4244,8 +4199,8 @@
         </p:nvSpPr>
         <p:spPr>
           <a:xfrm>
-            <a:off x="381000" y="1447800"/>
-            <a:ext cx="4724400" cy="461665"/>
+            <a:off x="304800" y="1371600"/>
+            <a:ext cx="5029200" cy="461665"/>
           </a:xfrm>
           <a:prstGeom prst="rect">
             <a:avLst/>
@@ -4260,31 +4215,195 @@
           <a:p>
             <a:r>
               <a:rPr lang="en-US" sz="2400" dirty="0" smtClean="0"/>
-              <a:t>Playback Rate</a:t>
-            </a:r>
-            <a:r>
-              <a:rPr lang="en-US" sz="2400" dirty="0" smtClean="0"/>
-              <a:t>:  87.0 kHz (optimal)</a:t>
+              <a:t>Sampling Rate:   73.7 kHz (optimal)</a:t>
             </a:r>
             <a:endParaRPr lang="en-US" sz="2400" dirty="0"/>
           </a:p>
         </p:txBody>
       </p:sp>
-      <p:sp>
-        <p:nvSpPr>
-          <p:cNvPr id="7" name="TextBox 6"/>
-          <p:cNvSpPr txBox="1"/>
+      <p:pic>
+        <p:nvPicPr>
+          <p:cNvPr id="2050" name="Picture 2"/>
+          <p:cNvPicPr>
+            <a:picLocks noChangeAspect="1" noChangeArrowheads="1"/>
+          </p:cNvPicPr>
           <p:nvPr/>
-        </p:nvSpPr>
-        <p:spPr>
-          <a:xfrm>
-            <a:off x="381000" y="5177135"/>
-            <a:ext cx="3505200" cy="461665"/>
+        </p:nvPicPr>
+        <p:blipFill>
+          <a:blip r:embed="rId3" cstate="print"/>
+          <a:srcRect/>
+          <a:stretch>
+            <a:fillRect/>
+          </a:stretch>
+        </p:blipFill>
+        <p:spPr bwMode="auto">
+          <a:xfrm>
+            <a:off x="992730" y="2133600"/>
+            <a:ext cx="7236870" cy="3048000"/>
+          </a:xfrm>
+          <a:prstGeom prst="rect">
+            <a:avLst/>
+          </a:prstGeom>
+          <a:ln>
+            <a:noFill/>
+          </a:ln>
+          <a:effectLst>
+            <a:outerShdw blurRad="292100" dist="139700" dir="2700000" algn="tl" rotWithShape="0">
+              <a:srgbClr val="333333">
+                <a:alpha val="65000"/>
+              </a:srgbClr>
+            </a:outerShdw>
+          </a:effectLst>
+        </p:spPr>
+      </p:pic>
+    </p:spTree>
+  </p:cSld>
+  <p:clrMapOvr>
+    <a:masterClrMapping/>
+  </p:clrMapOvr>
+  <p:timing>
+    <p:tnLst>
+      <p:par>
+        <p:cTn id="1" dur="indefinite" restart="never" nodeType="tmRoot"/>
+      </p:par>
+    </p:tnLst>
+  </p:timing>
+</p:sld>
+</file>
+
+<file path=ppt/slides/slide16.xml><?xml version="1.0" encoding="utf-8"?>
+<p:sld xmlns:a="http://schemas.openxmlformats.org/drawingml/2006/main" xmlns:r="http://schemas.openxmlformats.org/officeDocument/2006/relationships" xmlns:p="http://schemas.openxmlformats.org/presentationml/2006/main">
+  <p:cSld>
+    <p:spTree>
+      <p:nvGrpSpPr>
+        <p:cNvPr id="1" name=""/>
+        <p:cNvGrpSpPr/>
+        <p:nvPr/>
+      </p:nvGrpSpPr>
+      <p:grpSpPr>
+        <a:xfrm>
+          <a:off x="0" y="0"/>
+          <a:ext cx="0" cy="0"/>
+          <a:chOff x="0" y="0"/>
+          <a:chExt cx="0" cy="0"/>
+        </a:xfrm>
+      </p:grpSpPr>
+      <p:sp>
+        <p:nvSpPr>
+          <p:cNvPr id="2" name="Title 1"/>
+          <p:cNvSpPr>
+            <a:spLocks noGrp="1"/>
+          </p:cNvSpPr>
+          <p:nvPr>
+            <p:ph type="title"/>
+          </p:nvPr>
+        </p:nvSpPr>
+        <p:spPr/>
+        <p:txBody>
+          <a:bodyPr/>
+          <a:lstStyle/>
+          <a:p>
+            <a:endParaRPr lang="en-US" dirty="0"/>
+          </a:p>
+        </p:txBody>
+      </p:sp>
+      <p:sp>
+        <p:nvSpPr>
+          <p:cNvPr id="3" name="Content Placeholder 2"/>
+          <p:cNvSpPr>
+            <a:spLocks noGrp="1"/>
+          </p:cNvSpPr>
+          <p:nvPr>
+            <p:ph idx="1"/>
+          </p:nvPr>
+        </p:nvSpPr>
+        <p:spPr/>
+        <p:txBody>
+          <a:bodyPr/>
+          <a:lstStyle/>
+          <a:p>
+            <a:endParaRPr lang="en-US" dirty="0"/>
+          </a:p>
+        </p:txBody>
+      </p:sp>
+      <p:pic>
+        <p:nvPicPr>
+          <p:cNvPr id="4" name="Picture 2"/>
+          <p:cNvPicPr>
+            <a:picLocks noChangeAspect="1" noChangeArrowheads="1"/>
+          </p:cNvPicPr>
+          <p:nvPr/>
+        </p:nvPicPr>
+        <p:blipFill>
+          <a:blip r:embed="rId2" cstate="print">
+            <a:lum/>
+          </a:blip>
+          <a:srcRect/>
+          <a:stretch>
+            <a:fillRect/>
+          </a:stretch>
+        </p:blipFill>
+        <p:spPr bwMode="auto">
+          <a:xfrm>
+            <a:off x="0" y="0"/>
+            <a:ext cx="9144000" cy="6858000"/>
           </a:xfrm>
           <a:prstGeom prst="rect">
             <a:avLst/>
           </a:prstGeom>
           <a:noFill/>
+          <a:ln w="9525">
+            <a:noFill/>
+            <a:miter lim="800000"/>
+            <a:headEnd/>
+            <a:tailEnd/>
+          </a:ln>
+        </p:spPr>
+      </p:pic>
+      <p:sp>
+        <p:nvSpPr>
+          <p:cNvPr id="5" name="Rectangle 4"/>
+          <p:cNvSpPr/>
+          <p:nvPr/>
+        </p:nvSpPr>
+        <p:spPr>
+          <a:xfrm>
+            <a:off x="533400" y="381000"/>
+            <a:ext cx="8080032" cy="769441"/>
+          </a:xfrm>
+          <a:prstGeom prst="rect">
+            <a:avLst/>
+          </a:prstGeom>
+        </p:spPr>
+        <p:txBody>
+          <a:bodyPr wrap="none">
+            <a:spAutoFit/>
+          </a:bodyPr>
+          <a:lstStyle/>
+          <a:p>
+            <a:r>
+              <a:rPr lang="en-US" sz="4400" b="1" i="1" dirty="0" smtClean="0"/>
+              <a:t>Relevant Calculations (Continued)</a:t>
+            </a:r>
+            <a:endParaRPr lang="en-US" sz="4400" b="1" i="1" dirty="0"/>
+          </a:p>
+        </p:txBody>
+      </p:sp>
+      <p:sp>
+        <p:nvSpPr>
+          <p:cNvPr id="6" name="TextBox 5"/>
+          <p:cNvSpPr txBox="1"/>
+          <p:nvPr/>
+        </p:nvSpPr>
+        <p:spPr>
+          <a:xfrm>
+            <a:off x="381000" y="1447800"/>
+            <a:ext cx="4724400" cy="461665"/>
+          </a:xfrm>
+          <a:prstGeom prst="rect">
+            <a:avLst/>
+          </a:prstGeom>
+          <a:noFill/>
         </p:spPr>
         <p:txBody>
           <a:bodyPr wrap="square" rtlCol="0">
@@ -4294,11 +4413,37 @@
           <a:p>
             <a:r>
               <a:rPr lang="en-US" sz="2400" dirty="0" smtClean="0"/>
-              <a:t>Record Time</a:t>
-            </a:r>
+              <a:t>Playback Rate:  87.0 kHz (optimal)</a:t>
+            </a:r>
+            <a:endParaRPr lang="en-US" sz="2400" dirty="0"/>
+          </a:p>
+        </p:txBody>
+      </p:sp>
+      <p:sp>
+        <p:nvSpPr>
+          <p:cNvPr id="7" name="TextBox 6"/>
+          <p:cNvSpPr txBox="1"/>
+          <p:nvPr/>
+        </p:nvSpPr>
+        <p:spPr>
+          <a:xfrm>
+            <a:off x="381000" y="5177135"/>
+            <a:ext cx="3505200" cy="461665"/>
+          </a:xfrm>
+          <a:prstGeom prst="rect">
+            <a:avLst/>
+          </a:prstGeom>
+          <a:noFill/>
+        </p:spPr>
+        <p:txBody>
+          <a:bodyPr wrap="square" rtlCol="0">
+            <a:spAutoFit/>
+          </a:bodyPr>
+          <a:lstStyle/>
+          <a:p>
             <a:r>
               <a:rPr lang="en-US" sz="2400" dirty="0" smtClean="0"/>
-              <a:t>:  125 seconds  </a:t>
+              <a:t>Record Time:  125 seconds  </a:t>
             </a:r>
             <a:endParaRPr lang="en-US" sz="2400" dirty="0"/>
           </a:p>
@@ -4389,7 +4534,7 @@
 </p:sld>
 </file>
 
-<file path=ppt/slides/slide16.xml><?xml version="1.0" encoding="utf-8"?>
+<file path=ppt/slides/slide17.xml><?xml version="1.0" encoding="utf-8"?>
 <p:sld xmlns:a="http://schemas.openxmlformats.org/drawingml/2006/main" xmlns:r="http://schemas.openxmlformats.org/officeDocument/2006/relationships" xmlns:p="http://schemas.openxmlformats.org/presentationml/2006/main">
   <p:cSld>
     <p:spTree>
@@ -4531,7 +4676,6 @@
               <a:rPr lang="en-US" sz="3200" dirty="0" smtClean="0"/>
               <a:t>Thank You</a:t>
             </a:r>
-            <a:endParaRPr lang="en-US" sz="3200" dirty="0" smtClean="0"/>
           </a:p>
           <a:p>
             <a:pPr algn="ctr"/>
@@ -4579,7 +4723,7 @@
           <a:bodyPr/>
           <a:lstStyle/>
           <a:p>
-            <a:endParaRPr lang="en-US"/>
+            <a:endParaRPr lang="en-US" dirty="0"/>
           </a:p>
         </p:txBody>
       </p:sp>
@@ -4598,7 +4742,7 @@
           <a:bodyPr/>
           <a:lstStyle/>
           <a:p>
-            <a:endParaRPr lang="en-US"/>
+            <a:endParaRPr lang="en-US" dirty="0"/>
           </a:p>
         </p:txBody>
       </p:sp>
@@ -4697,15 +4841,7 @@
             <a:pPr lvl="1"/>
             <a:r>
               <a:rPr lang="en-US" sz="2800" dirty="0" smtClean="0"/>
-              <a:t>Design and Market an </a:t>
-            </a:r>
-            <a:r>
-              <a:rPr lang="en-US" sz="2800" dirty="0" err="1" smtClean="0"/>
-              <a:t>Arduino</a:t>
-            </a:r>
-            <a:r>
-              <a:rPr lang="en-US" sz="2800" dirty="0" smtClean="0"/>
-              <a:t> Shield</a:t>
+              <a:t>Design and Market an Arduino Shield</a:t>
             </a:r>
           </a:p>
         </p:txBody>
@@ -4734,15 +4870,7 @@
           <a:p>
             <a:r>
               <a:rPr lang="en-US" sz="2800" dirty="0" smtClean="0"/>
-              <a:t>What is an </a:t>
-            </a:r>
-            <a:r>
-              <a:rPr lang="en-US" sz="2800" dirty="0" err="1" smtClean="0"/>
-              <a:t>Arduino</a:t>
-            </a:r>
-            <a:r>
-              <a:rPr lang="en-US" sz="2800" dirty="0" smtClean="0"/>
-              <a:t>?</a:t>
+              <a:t>What is an Arduino?</a:t>
             </a:r>
             <a:endParaRPr lang="en-US" sz="2800" dirty="0"/>
           </a:p>
@@ -4807,15 +4935,7 @@
           <a:p>
             <a:r>
               <a:rPr lang="en-US" sz="2800" dirty="0" smtClean="0"/>
-              <a:t>What is an </a:t>
-            </a:r>
-            <a:r>
-              <a:rPr lang="en-US" sz="2800" dirty="0" err="1" smtClean="0"/>
-              <a:t>Arduino</a:t>
-            </a:r>
-            <a:r>
-              <a:rPr lang="en-US" sz="2800" dirty="0" smtClean="0"/>
-              <a:t> Shield?</a:t>
+              <a:t>What is an Arduino Shield?</a:t>
             </a:r>
             <a:endParaRPr lang="en-US" sz="2800" dirty="0"/>
           </a:p>
@@ -5241,23 +5361,7 @@
             </a:pPr>
             <a:r>
               <a:rPr lang="en-US" sz="2600" dirty="0" smtClean="0"/>
-              <a:t> Is fun and also </a:t>
-            </a:r>
-            <a:r>
-              <a:rPr lang="en-US" sz="2600" dirty="0" smtClean="0"/>
-              <a:t>“</a:t>
-            </a:r>
-            <a:r>
-              <a:rPr lang="en-US" sz="2600" dirty="0" err="1" smtClean="0"/>
-              <a:t>hackable</a:t>
-            </a:r>
-            <a:r>
-              <a:rPr lang="en-US" sz="2600" dirty="0" smtClean="0"/>
-              <a:t>”/</a:t>
-            </a:r>
-            <a:r>
-              <a:rPr lang="en-US" sz="2600" dirty="0" smtClean="0"/>
-              <a:t>expandable</a:t>
+              <a:t> Is fun and also “hackable”/expandable</a:t>
             </a:r>
           </a:p>
         </p:txBody>
@@ -5290,19 +5394,7 @@
             </a:pPr>
             <a:r>
               <a:rPr lang="en-US" sz="2600" dirty="0" smtClean="0"/>
-              <a:t> Provided an opportunity to become familiar </a:t>
-            </a:r>
-            <a:r>
-              <a:rPr lang="en-US" sz="2600" dirty="0" smtClean="0"/>
-              <a:t>in </a:t>
-            </a:r>
-            <a:r>
-              <a:rPr lang="en-US" sz="2600" dirty="0" smtClean="0"/>
-              <a:t> </a:t>
-            </a:r>
-            <a:r>
-              <a:rPr lang="en-US" sz="2600" dirty="0" smtClean="0"/>
-              <a:t>many areas we have not previously been exposed to</a:t>
+              <a:t> Provided an opportunity to become familiar in  many areas we have not previously been exposed to</a:t>
             </a:r>
           </a:p>
           <a:p>
@@ -5709,7 +5801,7 @@
           <a:bodyPr/>
           <a:lstStyle/>
           <a:p>
-            <a:endParaRPr lang="en-US"/>
+            <a:endParaRPr lang="en-US" dirty="0"/>
           </a:p>
         </p:txBody>
       </p:sp>
@@ -5854,12 +5946,8 @@
           <a:lstStyle/>
           <a:p>
             <a:r>
-              <a:rPr lang="en-US" sz="2400" dirty="0" err="1" smtClean="0"/>
-              <a:t>SpikenzieLabs</a:t>
-            </a:r>
-            <a:r>
               <a:rPr lang="en-US" sz="2400" dirty="0" smtClean="0"/>
-              <a:t> Voice Shield</a:t>
+              <a:t>SpikenzieLabs Voice Shield</a:t>
             </a:r>
             <a:endParaRPr lang="en-US" sz="2400" dirty="0"/>
           </a:p>
@@ -5923,12 +6011,8 @@
           <a:lstStyle/>
           <a:p>
             <a:r>
-              <a:rPr lang="en-US" sz="2400" dirty="0" err="1" smtClean="0"/>
-              <a:t>Ladyada</a:t>
-            </a:r>
-            <a:r>
               <a:rPr lang="en-US" sz="2400" dirty="0" smtClean="0"/>
-              <a:t> Wave Shield</a:t>
+              <a:t>Ladyada Wave Shield</a:t>
             </a:r>
             <a:endParaRPr lang="en-US" sz="2400" dirty="0"/>
           </a:p>
@@ -6083,7 +6167,7 @@
         <p:spPr>
           <a:xfrm>
             <a:off x="152400" y="3591580"/>
-            <a:ext cx="7239000" cy="523220"/>
+            <a:ext cx="8382000" cy="523220"/>
           </a:xfrm>
           <a:prstGeom prst="rect">
             <a:avLst/>
@@ -6102,7 +6186,15 @@
             </a:r>
             <a:r>
               <a:rPr lang="en-US" sz="2800" dirty="0" smtClean="0"/>
-              <a:t>)  (+/- 8g) Accelerometer Controlled Playback </a:t>
+              <a:t>)  (+/- 8g</a:t>
+            </a:r>
+            <a:r>
+              <a:rPr lang="en-US" sz="2800" dirty="0" smtClean="0"/>
+              <a:t>) 3-Axis </a:t>
+            </a:r>
+            <a:r>
+              <a:rPr lang="en-US" sz="2800" dirty="0" smtClean="0"/>
+              <a:t>Accelerometer Controlled Playback </a:t>
             </a:r>
             <a:endParaRPr lang="en-US" sz="2800" dirty="0"/>
           </a:p>
@@ -6117,7 +6209,7 @@
         <p:spPr>
           <a:xfrm>
             <a:off x="152400" y="2524780"/>
-            <a:ext cx="7315200" cy="523220"/>
+            <a:ext cx="8686800" cy="523220"/>
           </a:xfrm>
           <a:prstGeom prst="rect">
             <a:avLst/>
@@ -6132,16 +6224,13 @@
           <a:p>
             <a:r>
               <a:rPr lang="en-US" sz="2800" dirty="0" smtClean="0"/>
-              <a:t>2)  10-bit 16KHz recording/playback (</a:t>
-            </a:r>
-            <a:r>
-              <a:rPr lang="en-US" sz="2800" dirty="0" err="1" smtClean="0"/>
-              <a:t>naitive</a:t>
+              <a:t>2)  10-bit 16KHz recording/playback </a:t>
             </a:r>
             <a:r>
               <a:rPr lang="en-US" sz="2800" dirty="0" smtClean="0"/>
-              <a:t>)</a:t>
-            </a:r>
+              <a:t>(with no re-sampling)</a:t>
+            </a:r>
+            <a:endParaRPr lang="en-US" sz="2800" dirty="0" smtClean="0"/>
           </a:p>
         </p:txBody>
       </p:sp>
@@ -6177,9 +6266,39 @@
           <a:chExt cx="0" cy="0"/>
         </a:xfrm>
       </p:grpSpPr>
+      <p:sp>
+        <p:nvSpPr>
+          <p:cNvPr id="6" name="TextBox 5"/>
+          <p:cNvSpPr txBox="1"/>
+          <p:nvPr/>
+        </p:nvSpPr>
+        <p:spPr>
+          <a:xfrm>
+            <a:off x="1524000" y="0"/>
+            <a:ext cx="6172200" cy="769441"/>
+          </a:xfrm>
+          <a:prstGeom prst="rect">
+            <a:avLst/>
+          </a:prstGeom>
+          <a:noFill/>
+        </p:spPr>
+        <p:txBody>
+          <a:bodyPr wrap="square" rtlCol="0">
+            <a:spAutoFit/>
+          </a:bodyPr>
+          <a:lstStyle/>
+          <a:p>
+            <a:r>
+              <a:rPr lang="en-US" sz="4400" b="1" i="1" dirty="0" smtClean="0"/>
+              <a:t>Wave-Motion Flow Chart</a:t>
+            </a:r>
+            <a:endParaRPr lang="en-US" sz="4400" b="1" i="1" dirty="0"/>
+          </a:p>
+        </p:txBody>
+      </p:sp>
       <p:pic>
         <p:nvPicPr>
-          <p:cNvPr id="4099" name="Picture 3"/>
+          <p:cNvPr id="4" name="Picture 2"/>
           <p:cNvPicPr>
             <a:picLocks noChangeAspect="1" noChangeArrowheads="1"/>
           </p:cNvPicPr>
@@ -6194,8 +6313,8 @@
         </p:blipFill>
         <p:spPr bwMode="auto">
           <a:xfrm>
-            <a:off x="0" y="762000"/>
-            <a:ext cx="9147424" cy="6105525"/>
+            <a:off x="152400" y="762000"/>
+            <a:ext cx="8867775" cy="6057900"/>
           </a:xfrm>
           <a:prstGeom prst="rect">
             <a:avLst/>
@@ -6209,36 +6328,6 @@
           </a:ln>
         </p:spPr>
       </p:pic>
-      <p:sp>
-        <p:nvSpPr>
-          <p:cNvPr id="6" name="TextBox 5"/>
-          <p:cNvSpPr txBox="1"/>
-          <p:nvPr/>
-        </p:nvSpPr>
-        <p:spPr>
-          <a:xfrm>
-            <a:off x="1524000" y="0"/>
-            <a:ext cx="6172200" cy="769441"/>
-          </a:xfrm>
-          <a:prstGeom prst="rect">
-            <a:avLst/>
-          </a:prstGeom>
-          <a:noFill/>
-        </p:spPr>
-        <p:txBody>
-          <a:bodyPr wrap="square" rtlCol="0">
-            <a:spAutoFit/>
-          </a:bodyPr>
-          <a:lstStyle/>
-          <a:p>
-            <a:r>
-              <a:rPr lang="en-US" sz="4400" b="1" i="1" dirty="0" smtClean="0"/>
-              <a:t>Wave-Motion Flow Chart</a:t>
-            </a:r>
-            <a:endParaRPr lang="en-US" sz="4400" b="1" i="1" dirty="0"/>
-          </a:p>
-        </p:txBody>
-      </p:sp>
     </p:spTree>
   </p:cSld>
   <p:clrMapOvr>
@@ -6286,7 +6375,7 @@
           <a:bodyPr/>
           <a:lstStyle/>
           <a:p>
-            <a:endParaRPr lang="en-US"/>
+            <a:endParaRPr lang="en-US" dirty="0"/>
           </a:p>
         </p:txBody>
       </p:sp>
@@ -6305,7 +6394,7 @@
           <a:bodyPr/>
           <a:lstStyle/>
           <a:p>
-            <a:endParaRPr lang="en-US"/>
+            <a:endParaRPr lang="en-US" dirty="0"/>
           </a:p>
         </p:txBody>
       </p:sp>
@@ -6627,7 +6716,7 @@
       </p:sp>
       <p:pic>
         <p:nvPicPr>
-          <p:cNvPr id="1028" name="Picture 4"/>
+          <p:cNvPr id="1026" name="Picture 2"/>
           <p:cNvPicPr>
             <a:picLocks noChangeAspect="1" noChangeArrowheads="1"/>
           </p:cNvPicPr>
@@ -6637,7 +6726,7 @@
           <a:blip r:embed="rId2" cstate="print">
             <a:extLst>
               <a:ext uri="{28A0092B-C50C-407E-A947-70E740481C1C}">
-                <a14:useLocalDpi xmlns:a14="http://schemas.microsoft.com/office/drawing/2010/main" xmlns="" val="0"/>
+                <a14:useLocalDpi xmlns:a14="http://schemas.microsoft.com/office/drawing/2010/main" val="0"/>
               </a:ext>
             </a:extLst>
           </a:blip>
@@ -6648,8 +6737,8 @@
         </p:blipFill>
         <p:spPr bwMode="auto">
           <a:xfrm>
-            <a:off x="762000" y="1371600"/>
-            <a:ext cx="7742068" cy="4967288"/>
+            <a:off x="1143000" y="1730212"/>
+            <a:ext cx="6881812" cy="4483489"/>
           </a:xfrm>
           <a:prstGeom prst="rect">
             <a:avLst/>
@@ -6661,14 +6750,14 @@
           <a:effectLst/>
           <a:extLst>
             <a:ext uri="{909E8E84-426E-40DD-AFC4-6F175D3DCCD1}">
-              <a14:hiddenFill xmlns:a14="http://schemas.microsoft.com/office/drawing/2010/main" xmlns="">
+              <a14:hiddenFill xmlns:a14="http://schemas.microsoft.com/office/drawing/2010/main">
                 <a:solidFill>
                   <a:schemeClr val="accent1"/>
                 </a:solidFill>
               </a14:hiddenFill>
             </a:ext>
             <a:ext uri="{91240B29-F687-4F45-9708-019B960494DF}">
-              <a14:hiddenLine xmlns:a14="http://schemas.microsoft.com/office/drawing/2010/main" xmlns="" w="9525">
+              <a14:hiddenLine xmlns:a14="http://schemas.microsoft.com/office/drawing/2010/main" w="9525">
                 <a:solidFill>
                   <a:schemeClr val="tx1"/>
                 </a:solidFill>
@@ -6678,7 +6767,7 @@
               </a14:hiddenLine>
             </a:ext>
             <a:ext uri="{AF507438-7753-43E0-B8FC-AC1667EBCBE1}">
-              <a14:hiddenEffects xmlns:a14="http://schemas.microsoft.com/office/drawing/2010/main" xmlns="">
+              <a14:hiddenEffects xmlns:a14="http://schemas.microsoft.com/office/drawing/2010/main">
                 <a:effectLst>
                   <a:outerShdw dist="35921" dir="2700000" algn="ctr" rotWithShape="0">
                     <a:schemeClr val="bg2"/>
@@ -6692,7 +6781,7 @@
     </p:spTree>
     <p:extLst>
       <p:ext uri="{BB962C8B-B14F-4D97-AF65-F5344CB8AC3E}">
-        <p14:creationId xmlns:p14="http://schemas.microsoft.com/office/powerpoint/2010/main" xmlns="" val="4204252950"/>
+        <p14:creationId xmlns:p14="http://schemas.microsoft.com/office/powerpoint/2010/main" val="4204252950"/>
       </p:ext>
     </p:extLst>
   </p:cSld>
@@ -6763,7 +6852,7 @@
           <a:blip r:embed="rId2" cstate="print">
             <a:extLst>
               <a:ext uri="{28A0092B-C50C-407E-A947-70E740481C1C}">
-                <a14:useLocalDpi xmlns:a14="http://schemas.microsoft.com/office/drawing/2010/main" xmlns="" val="0"/>
+                <a14:useLocalDpi xmlns:a14="http://schemas.microsoft.com/office/drawing/2010/main" val="0"/>
               </a:ext>
             </a:extLst>
           </a:blip>
@@ -6787,14 +6876,14 @@
           <a:effectLst/>
           <a:extLst>
             <a:ext uri="{909E8E84-426E-40DD-AFC4-6F175D3DCCD1}">
-              <a14:hiddenFill xmlns:a14="http://schemas.microsoft.com/office/drawing/2010/main" xmlns="">
+              <a14:hiddenFill xmlns:a14="http://schemas.microsoft.com/office/drawing/2010/main">
                 <a:solidFill>
                   <a:schemeClr val="accent1"/>
                 </a:solidFill>
               </a14:hiddenFill>
             </a:ext>
             <a:ext uri="{91240B29-F687-4F45-9708-019B960494DF}">
-              <a14:hiddenLine xmlns:a14="http://schemas.microsoft.com/office/drawing/2010/main" xmlns="" w="9525">
+              <a14:hiddenLine xmlns:a14="http://schemas.microsoft.com/office/drawing/2010/main" w="9525">
                 <a:solidFill>
                   <a:schemeClr val="tx1"/>
                 </a:solidFill>
@@ -6804,7 +6893,7 @@
               </a14:hiddenLine>
             </a:ext>
             <a:ext uri="{AF507438-7753-43E0-B8FC-AC1667EBCBE1}">
-              <a14:hiddenEffects xmlns:a14="http://schemas.microsoft.com/office/drawing/2010/main" xmlns="">
+              <a14:hiddenEffects xmlns:a14="http://schemas.microsoft.com/office/drawing/2010/main">
                 <a:effectLst>
                   <a:outerShdw dist="35921" dir="2700000" algn="ctr" rotWithShape="0">
                     <a:schemeClr val="bg2"/>
@@ -6818,7 +6907,7 @@
     </p:spTree>
     <p:extLst>
       <p:ext uri="{BB962C8B-B14F-4D97-AF65-F5344CB8AC3E}">
-        <p14:creationId xmlns:p14="http://schemas.microsoft.com/office/powerpoint/2010/main" xmlns="" val="1846641352"/>
+        <p14:creationId xmlns:p14="http://schemas.microsoft.com/office/powerpoint/2010/main" val="1846641352"/>
       </p:ext>
     </p:extLst>
   </p:cSld>

</xml_diff>

<commit_message>
Modified Presentation of Design
</commit_message>
<xml_diff>
--- a/Presentation/Design Review.pptx
+++ b/Presentation/Design Review.pptx
@@ -18,10 +18,9 @@
     <p:sldId id="269" r:id="rId12"/>
     <p:sldId id="270" r:id="rId13"/>
     <p:sldId id="271" r:id="rId14"/>
-    <p:sldId id="273" r:id="rId15"/>
-    <p:sldId id="263" r:id="rId16"/>
-    <p:sldId id="264" r:id="rId17"/>
-    <p:sldId id="265" r:id="rId18"/>
+    <p:sldId id="263" r:id="rId15"/>
+    <p:sldId id="264" r:id="rId16"/>
+    <p:sldId id="265" r:id="rId17"/>
   </p:sldIdLst>
   <p:sldSz cx="9144000" cy="6858000" type="screen4x3"/>
   <p:notesSz cx="6858000" cy="9144000"/>
@@ -3889,7 +3888,7 @@
       </p:grpSpPr>
       <p:sp>
         <p:nvSpPr>
-          <p:cNvPr id="7" name="Title 6"/>
+          <p:cNvPr id="2" name="Title 1"/>
           <p:cNvSpPr>
             <a:spLocks noGrp="1"/>
           </p:cNvSpPr>
@@ -3908,7 +3907,7 @@
       </p:sp>
       <p:sp>
         <p:nvSpPr>
-          <p:cNvPr id="8" name="Content Placeholder 7"/>
+          <p:cNvPr id="3" name="Content Placeholder 2"/>
           <p:cNvSpPr>
             <a:spLocks noGrp="1"/>
           </p:cNvSpPr>
@@ -3967,8 +3966,8 @@
         </p:nvSpPr>
         <p:spPr>
           <a:xfrm>
-            <a:off x="3200982" y="315686"/>
-            <a:ext cx="2742033" cy="769441"/>
+            <a:off x="1981200" y="304800"/>
+            <a:ext cx="5209503" cy="769441"/>
           </a:xfrm>
           <a:prstGeom prst="rect">
             <a:avLst/>
@@ -3980,31 +3979,54 @@
           </a:bodyPr>
           <a:lstStyle/>
           <a:p>
-            <a:pPr algn="ctr"/>
-            <a:r>
-              <a:rPr lang="en-US" sz="4400" dirty="0"/>
-              <a:t>PCB Layout</a:t>
+            <a:r>
+              <a:rPr lang="en-US" sz="4400" b="1" i="1" dirty="0" smtClean="0"/>
+              <a:t>Relevant Calculations</a:t>
             </a:r>
             <a:endParaRPr lang="en-US" sz="4400" b="1" i="1" dirty="0"/>
+          </a:p>
+        </p:txBody>
+      </p:sp>
+      <p:sp>
+        <p:nvSpPr>
+          <p:cNvPr id="6" name="TextBox 5"/>
+          <p:cNvSpPr txBox="1"/>
+          <p:nvPr/>
+        </p:nvSpPr>
+        <p:spPr>
+          <a:xfrm>
+            <a:off x="304800" y="1371600"/>
+            <a:ext cx="5029200" cy="461665"/>
+          </a:xfrm>
+          <a:prstGeom prst="rect">
+            <a:avLst/>
+          </a:prstGeom>
+          <a:noFill/>
+        </p:spPr>
+        <p:txBody>
+          <a:bodyPr wrap="square" rtlCol="0">
+            <a:spAutoFit/>
+          </a:bodyPr>
+          <a:lstStyle/>
+          <a:p>
+            <a:r>
+              <a:rPr lang="en-US" sz="2400" dirty="0" smtClean="0"/>
+              <a:t>Sampling Rate:   73.7 kHz (optimal)</a:t>
+            </a:r>
+            <a:endParaRPr lang="en-US" sz="2400" dirty="0"/>
           </a:p>
         </p:txBody>
       </p:sp>
       <p:pic>
         <p:nvPicPr>
-          <p:cNvPr id="10" name="Picture 2"/>
+          <p:cNvPr id="2050" name="Picture 2"/>
           <p:cNvPicPr>
             <a:picLocks noChangeAspect="1" noChangeArrowheads="1"/>
           </p:cNvPicPr>
           <p:nvPr/>
         </p:nvPicPr>
         <p:blipFill>
-          <a:blip r:embed="rId3" cstate="print">
-            <a:extLst>
-              <a:ext uri="{28A0092B-C50C-407E-A947-70E740481C1C}">
-                <a14:useLocalDpi xmlns:a14="http://schemas.microsoft.com/office/drawing/2010/main" val="0"/>
-              </a:ext>
-            </a:extLst>
-          </a:blip>
+          <a:blip r:embed="rId3" cstate="print"/>
           <a:srcRect/>
           <a:stretch>
             <a:fillRect/>
@@ -4012,53 +4034,25 @@
         </p:blipFill>
         <p:spPr bwMode="auto">
           <a:xfrm>
-            <a:off x="1607342" y="1371600"/>
-            <a:ext cx="5929312" cy="5061230"/>
+            <a:off x="992730" y="2133600"/>
+            <a:ext cx="7236870" cy="3048000"/>
           </a:xfrm>
           <a:prstGeom prst="rect">
             <a:avLst/>
           </a:prstGeom>
-          <a:noFill/>
           <a:ln>
             <a:noFill/>
           </a:ln>
-          <a:effectLst/>
-          <a:extLst>
-            <a:ext uri="{909E8E84-426E-40DD-AFC4-6F175D3DCCD1}">
-              <a14:hiddenFill xmlns:a14="http://schemas.microsoft.com/office/drawing/2010/main">
-                <a:solidFill>
-                  <a:schemeClr val="accent1"/>
-                </a:solidFill>
-              </a14:hiddenFill>
-            </a:ext>
-            <a:ext uri="{91240B29-F687-4F45-9708-019B960494DF}">
-              <a14:hiddenLine xmlns:a14="http://schemas.microsoft.com/office/drawing/2010/main" w="9525">
-                <a:solidFill>
-                  <a:schemeClr val="tx1"/>
-                </a:solidFill>
-                <a:miter lim="800000"/>
-                <a:headEnd/>
-                <a:tailEnd/>
-              </a14:hiddenLine>
-            </a:ext>
-            <a:ext uri="{AF507438-7753-43E0-B8FC-AC1667EBCBE1}">
-              <a14:hiddenEffects xmlns:a14="http://schemas.microsoft.com/office/drawing/2010/main">
-                <a:effectLst>
-                  <a:outerShdw dist="35921" dir="2700000" algn="ctr" rotWithShape="0">
-                    <a:schemeClr val="bg2"/>
-                  </a:outerShdw>
-                </a:effectLst>
-              </a14:hiddenEffects>
-            </a:ext>
-          </a:extLst>
+          <a:effectLst>
+            <a:outerShdw blurRad="292100" dist="139700" dir="2700000" algn="tl" rotWithShape="0">
+              <a:srgbClr val="333333">
+                <a:alpha val="65000"/>
+              </a:srgbClr>
+            </a:outerShdw>
+          </a:effectLst>
         </p:spPr>
       </p:pic>
     </p:spTree>
-    <p:extLst>
-      <p:ext uri="{BB962C8B-B14F-4D97-AF65-F5344CB8AC3E}">
-        <p14:creationId xmlns:p14="http://schemas.microsoft.com/office/powerpoint/2010/main" val="3508047719"/>
-      </p:ext>
-    </p:extLst>
   </p:cSld>
   <p:clrMapOvr>
     <a:masterClrMapping/>
@@ -4170,8 +4164,8 @@
         </p:nvSpPr>
         <p:spPr>
           <a:xfrm>
-            <a:off x="1981200" y="304800"/>
-            <a:ext cx="5209503" cy="769441"/>
+            <a:off x="533400" y="381000"/>
+            <a:ext cx="8080032" cy="769441"/>
           </a:xfrm>
           <a:prstGeom prst="rect">
             <a:avLst/>
@@ -4185,7 +4179,7 @@
           <a:p>
             <a:r>
               <a:rPr lang="en-US" sz="4400" b="1" i="1" dirty="0" smtClean="0"/>
-              <a:t>Relevant Calculations</a:t>
+              <a:t>Relevant Calculations (Continued)</a:t>
             </a:r>
             <a:endParaRPr lang="en-US" sz="4400" b="1" i="1" dirty="0"/>
           </a:p>
@@ -4199,8 +4193,8 @@
         </p:nvSpPr>
         <p:spPr>
           <a:xfrm>
-            <a:off x="304800" y="1371600"/>
-            <a:ext cx="5029200" cy="461665"/>
+            <a:off x="381000" y="1447800"/>
+            <a:ext cx="4724400" cy="461665"/>
           </a:xfrm>
           <a:prstGeom prst="rect">
             <a:avLst/>
@@ -4215,7 +4209,37 @@
           <a:p>
             <a:r>
               <a:rPr lang="en-US" sz="2400" dirty="0" smtClean="0"/>
-              <a:t>Sampling Rate:   73.7 kHz (optimal)</a:t>
+              <a:t>Playback Rate:  87.0 kHz (optimal)</a:t>
+            </a:r>
+            <a:endParaRPr lang="en-US" sz="2400" dirty="0"/>
+          </a:p>
+        </p:txBody>
+      </p:sp>
+      <p:sp>
+        <p:nvSpPr>
+          <p:cNvPr id="7" name="TextBox 6"/>
+          <p:cNvSpPr txBox="1"/>
+          <p:nvPr/>
+        </p:nvSpPr>
+        <p:spPr>
+          <a:xfrm>
+            <a:off x="381000" y="5177135"/>
+            <a:ext cx="3505200" cy="461665"/>
+          </a:xfrm>
+          <a:prstGeom prst="rect">
+            <a:avLst/>
+          </a:prstGeom>
+          <a:noFill/>
+        </p:spPr>
+        <p:txBody>
+          <a:bodyPr wrap="square" rtlCol="0">
+            <a:spAutoFit/>
+          </a:bodyPr>
+          <a:lstStyle/>
+          <a:p>
+            <a:r>
+              <a:rPr lang="en-US" sz="2400" dirty="0" smtClean="0"/>
+              <a:t>Record Time:  125 seconds  </a:t>
             </a:r>
             <a:endParaRPr lang="en-US" sz="2400" dirty="0"/>
           </a:p>
@@ -4223,7 +4247,7 @@
       </p:sp>
       <p:pic>
         <p:nvPicPr>
-          <p:cNvPr id="2050" name="Picture 2"/>
+          <p:cNvPr id="8" name="Picture 2"/>
           <p:cNvPicPr>
             <a:picLocks noChangeAspect="1" noChangeArrowheads="1"/>
           </p:cNvPicPr>
@@ -4238,8 +4262,43 @@
         </p:blipFill>
         <p:spPr bwMode="auto">
           <a:xfrm>
-            <a:off x="992730" y="2133600"/>
-            <a:ext cx="7236870" cy="3048000"/>
+            <a:off x="1981200" y="5634038"/>
+            <a:ext cx="5076602" cy="919162"/>
+          </a:xfrm>
+          <a:prstGeom prst="rect">
+            <a:avLst/>
+          </a:prstGeom>
+          <a:ln>
+            <a:noFill/>
+          </a:ln>
+          <a:effectLst>
+            <a:outerShdw blurRad="292100" dist="139700" dir="2700000" algn="tl" rotWithShape="0">
+              <a:srgbClr val="333333">
+                <a:alpha val="65000"/>
+              </a:srgbClr>
+            </a:outerShdw>
+          </a:effectLst>
+        </p:spPr>
+      </p:pic>
+      <p:pic>
+        <p:nvPicPr>
+          <p:cNvPr id="1027" name="Picture 3"/>
+          <p:cNvPicPr>
+            <a:picLocks noChangeAspect="1" noChangeArrowheads="1"/>
+          </p:cNvPicPr>
+          <p:nvPr/>
+        </p:nvPicPr>
+        <p:blipFill>
+          <a:blip r:embed="rId4" cstate="print"/>
+          <a:srcRect/>
+          <a:stretch>
+            <a:fillRect/>
+          </a:stretch>
+        </p:blipFill>
+        <p:spPr bwMode="auto">
+          <a:xfrm>
+            <a:off x="1447800" y="1981200"/>
+            <a:ext cx="6323266" cy="2976562"/>
           </a:xfrm>
           <a:prstGeom prst="rect">
             <a:avLst/>
@@ -4272,269 +4331,6 @@
 </file>
 
 <file path=ppt/slides/slide16.xml><?xml version="1.0" encoding="utf-8"?>
-<p:sld xmlns:a="http://schemas.openxmlformats.org/drawingml/2006/main" xmlns:r="http://schemas.openxmlformats.org/officeDocument/2006/relationships" xmlns:p="http://schemas.openxmlformats.org/presentationml/2006/main">
-  <p:cSld>
-    <p:spTree>
-      <p:nvGrpSpPr>
-        <p:cNvPr id="1" name=""/>
-        <p:cNvGrpSpPr/>
-        <p:nvPr/>
-      </p:nvGrpSpPr>
-      <p:grpSpPr>
-        <a:xfrm>
-          <a:off x="0" y="0"/>
-          <a:ext cx="0" cy="0"/>
-          <a:chOff x="0" y="0"/>
-          <a:chExt cx="0" cy="0"/>
-        </a:xfrm>
-      </p:grpSpPr>
-      <p:sp>
-        <p:nvSpPr>
-          <p:cNvPr id="2" name="Title 1"/>
-          <p:cNvSpPr>
-            <a:spLocks noGrp="1"/>
-          </p:cNvSpPr>
-          <p:nvPr>
-            <p:ph type="title"/>
-          </p:nvPr>
-        </p:nvSpPr>
-        <p:spPr/>
-        <p:txBody>
-          <a:bodyPr/>
-          <a:lstStyle/>
-          <a:p>
-            <a:endParaRPr lang="en-US" dirty="0"/>
-          </a:p>
-        </p:txBody>
-      </p:sp>
-      <p:sp>
-        <p:nvSpPr>
-          <p:cNvPr id="3" name="Content Placeholder 2"/>
-          <p:cNvSpPr>
-            <a:spLocks noGrp="1"/>
-          </p:cNvSpPr>
-          <p:nvPr>
-            <p:ph idx="1"/>
-          </p:nvPr>
-        </p:nvSpPr>
-        <p:spPr/>
-        <p:txBody>
-          <a:bodyPr/>
-          <a:lstStyle/>
-          <a:p>
-            <a:endParaRPr lang="en-US" dirty="0"/>
-          </a:p>
-        </p:txBody>
-      </p:sp>
-      <p:pic>
-        <p:nvPicPr>
-          <p:cNvPr id="4" name="Picture 2"/>
-          <p:cNvPicPr>
-            <a:picLocks noChangeAspect="1" noChangeArrowheads="1"/>
-          </p:cNvPicPr>
-          <p:nvPr/>
-        </p:nvPicPr>
-        <p:blipFill>
-          <a:blip r:embed="rId2" cstate="print">
-            <a:lum/>
-          </a:blip>
-          <a:srcRect/>
-          <a:stretch>
-            <a:fillRect/>
-          </a:stretch>
-        </p:blipFill>
-        <p:spPr bwMode="auto">
-          <a:xfrm>
-            <a:off x="0" y="0"/>
-            <a:ext cx="9144000" cy="6858000"/>
-          </a:xfrm>
-          <a:prstGeom prst="rect">
-            <a:avLst/>
-          </a:prstGeom>
-          <a:noFill/>
-          <a:ln w="9525">
-            <a:noFill/>
-            <a:miter lim="800000"/>
-            <a:headEnd/>
-            <a:tailEnd/>
-          </a:ln>
-        </p:spPr>
-      </p:pic>
-      <p:sp>
-        <p:nvSpPr>
-          <p:cNvPr id="5" name="Rectangle 4"/>
-          <p:cNvSpPr/>
-          <p:nvPr/>
-        </p:nvSpPr>
-        <p:spPr>
-          <a:xfrm>
-            <a:off x="533400" y="381000"/>
-            <a:ext cx="8080032" cy="769441"/>
-          </a:xfrm>
-          <a:prstGeom prst="rect">
-            <a:avLst/>
-          </a:prstGeom>
-        </p:spPr>
-        <p:txBody>
-          <a:bodyPr wrap="none">
-            <a:spAutoFit/>
-          </a:bodyPr>
-          <a:lstStyle/>
-          <a:p>
-            <a:r>
-              <a:rPr lang="en-US" sz="4400" b="1" i="1" dirty="0" smtClean="0"/>
-              <a:t>Relevant Calculations (Continued)</a:t>
-            </a:r>
-            <a:endParaRPr lang="en-US" sz="4400" b="1" i="1" dirty="0"/>
-          </a:p>
-        </p:txBody>
-      </p:sp>
-      <p:sp>
-        <p:nvSpPr>
-          <p:cNvPr id="6" name="TextBox 5"/>
-          <p:cNvSpPr txBox="1"/>
-          <p:nvPr/>
-        </p:nvSpPr>
-        <p:spPr>
-          <a:xfrm>
-            <a:off x="381000" y="1447800"/>
-            <a:ext cx="4724400" cy="461665"/>
-          </a:xfrm>
-          <a:prstGeom prst="rect">
-            <a:avLst/>
-          </a:prstGeom>
-          <a:noFill/>
-        </p:spPr>
-        <p:txBody>
-          <a:bodyPr wrap="square" rtlCol="0">
-            <a:spAutoFit/>
-          </a:bodyPr>
-          <a:lstStyle/>
-          <a:p>
-            <a:r>
-              <a:rPr lang="en-US" sz="2400" dirty="0" smtClean="0"/>
-              <a:t>Playback Rate:  87.0 kHz (optimal)</a:t>
-            </a:r>
-            <a:endParaRPr lang="en-US" sz="2400" dirty="0"/>
-          </a:p>
-        </p:txBody>
-      </p:sp>
-      <p:sp>
-        <p:nvSpPr>
-          <p:cNvPr id="7" name="TextBox 6"/>
-          <p:cNvSpPr txBox="1"/>
-          <p:nvPr/>
-        </p:nvSpPr>
-        <p:spPr>
-          <a:xfrm>
-            <a:off x="381000" y="5177135"/>
-            <a:ext cx="3505200" cy="461665"/>
-          </a:xfrm>
-          <a:prstGeom prst="rect">
-            <a:avLst/>
-          </a:prstGeom>
-          <a:noFill/>
-        </p:spPr>
-        <p:txBody>
-          <a:bodyPr wrap="square" rtlCol="0">
-            <a:spAutoFit/>
-          </a:bodyPr>
-          <a:lstStyle/>
-          <a:p>
-            <a:r>
-              <a:rPr lang="en-US" sz="2400" dirty="0" smtClean="0"/>
-              <a:t>Record Time:  125 seconds  </a:t>
-            </a:r>
-            <a:endParaRPr lang="en-US" sz="2400" dirty="0"/>
-          </a:p>
-        </p:txBody>
-      </p:sp>
-      <p:pic>
-        <p:nvPicPr>
-          <p:cNvPr id="8" name="Picture 2"/>
-          <p:cNvPicPr>
-            <a:picLocks noChangeAspect="1" noChangeArrowheads="1"/>
-          </p:cNvPicPr>
-          <p:nvPr/>
-        </p:nvPicPr>
-        <p:blipFill>
-          <a:blip r:embed="rId3" cstate="print"/>
-          <a:srcRect/>
-          <a:stretch>
-            <a:fillRect/>
-          </a:stretch>
-        </p:blipFill>
-        <p:spPr bwMode="auto">
-          <a:xfrm>
-            <a:off x="1981200" y="5634038"/>
-            <a:ext cx="5076602" cy="919162"/>
-          </a:xfrm>
-          <a:prstGeom prst="rect">
-            <a:avLst/>
-          </a:prstGeom>
-          <a:ln>
-            <a:noFill/>
-          </a:ln>
-          <a:effectLst>
-            <a:outerShdw blurRad="292100" dist="139700" dir="2700000" algn="tl" rotWithShape="0">
-              <a:srgbClr val="333333">
-                <a:alpha val="65000"/>
-              </a:srgbClr>
-            </a:outerShdw>
-          </a:effectLst>
-        </p:spPr>
-      </p:pic>
-      <p:pic>
-        <p:nvPicPr>
-          <p:cNvPr id="1027" name="Picture 3"/>
-          <p:cNvPicPr>
-            <a:picLocks noChangeAspect="1" noChangeArrowheads="1"/>
-          </p:cNvPicPr>
-          <p:nvPr/>
-        </p:nvPicPr>
-        <p:blipFill>
-          <a:blip r:embed="rId4" cstate="print"/>
-          <a:srcRect/>
-          <a:stretch>
-            <a:fillRect/>
-          </a:stretch>
-        </p:blipFill>
-        <p:spPr bwMode="auto">
-          <a:xfrm>
-            <a:off x="1447800" y="1981200"/>
-            <a:ext cx="6323266" cy="2976562"/>
-          </a:xfrm>
-          <a:prstGeom prst="rect">
-            <a:avLst/>
-          </a:prstGeom>
-          <a:ln>
-            <a:noFill/>
-          </a:ln>
-          <a:effectLst>
-            <a:outerShdw blurRad="292100" dist="139700" dir="2700000" algn="tl" rotWithShape="0">
-              <a:srgbClr val="333333">
-                <a:alpha val="65000"/>
-              </a:srgbClr>
-            </a:outerShdw>
-          </a:effectLst>
-        </p:spPr>
-      </p:pic>
-    </p:spTree>
-  </p:cSld>
-  <p:clrMapOvr>
-    <a:masterClrMapping/>
-  </p:clrMapOvr>
-  <p:timing>
-    <p:tnLst>
-      <p:par>
-        <p:cTn id="1" dur="indefinite" restart="never" nodeType="tmRoot"/>
-      </p:par>
-    </p:tnLst>
-  </p:timing>
-</p:sld>
-</file>
-
-<file path=ppt/slides/slide17.xml><?xml version="1.0" encoding="utf-8"?>
 <p:sld xmlns:a="http://schemas.openxmlformats.org/drawingml/2006/main" xmlns:r="http://schemas.openxmlformats.org/officeDocument/2006/relationships" xmlns:p="http://schemas.openxmlformats.org/presentationml/2006/main">
   <p:cSld>
     <p:spTree>
@@ -6186,15 +5982,7 @@
             </a:r>
             <a:r>
               <a:rPr lang="en-US" sz="2800" dirty="0" smtClean="0"/>
-              <a:t>)  (+/- 8g</a:t>
-            </a:r>
-            <a:r>
-              <a:rPr lang="en-US" sz="2800" dirty="0" smtClean="0"/>
-              <a:t>) 3-Axis </a:t>
-            </a:r>
-            <a:r>
-              <a:rPr lang="en-US" sz="2800" dirty="0" smtClean="0"/>
-              <a:t>Accelerometer Controlled Playback </a:t>
+              <a:t>)  (+/- 8g) 3-Axis Accelerometer Controlled Playback </a:t>
             </a:r>
             <a:endParaRPr lang="en-US" sz="2800" dirty="0"/>
           </a:p>
@@ -6224,13 +6012,8 @@
           <a:p>
             <a:r>
               <a:rPr lang="en-US" sz="2800" dirty="0" smtClean="0"/>
-              <a:t>2)  10-bit 16KHz recording/playback </a:t>
-            </a:r>
-            <a:r>
-              <a:rPr lang="en-US" sz="2800" dirty="0" smtClean="0"/>
-              <a:t>(with no re-sampling)</a:t>
-            </a:r>
-            <a:endParaRPr lang="en-US" sz="2800" dirty="0" smtClean="0"/>
+              <a:t>2)  10-bit 16KHz recording/playback (with no re-sampling)</a:t>
+            </a:r>
           </a:p>
         </p:txBody>
       </p:sp>

</xml_diff>